<commit_message>
Update PPTX and Activity 7
</commit_message>
<xml_diff>
--- a/MOD07_Sobrecarga_de_Metodos/01 Presentacion/INFO2_MOD07-Sobrecarga.pptx
+++ b/MOD07_Sobrecarga_de_Metodos/01 Presentacion/INFO2_MOD07-Sobrecarga.pptx
@@ -11499,7 +11499,7 @@
                 <a:latin typeface="Roboto" panose="02000000000000000000" pitchFamily="2" charset="0"/>
                 <a:ea typeface="Roboto" panose="02000000000000000000" pitchFamily="2" charset="0"/>
               </a:rPr>
-              <a:t>El modificador de acceso, o ser estático vs de instancia no es suficiente para sobrecargar un método!</a:t>
+              <a:t>El modificador de acceso, ser estático vs de instancia o el valor de retorno no son suficientes para sobrecargar un método!</a:t>
             </a:r>
             <a:endParaRPr lang="en-US" sz="3200" b="1" dirty="0">
               <a:solidFill>
@@ -11525,8 +11525,8 @@
         </p:nvSpPr>
         <p:spPr bwMode="auto">
           <a:xfrm>
-            <a:off x="594168" y="1591535"/>
-            <a:ext cx="2114310" cy="387736"/>
+            <a:off x="594167" y="1591535"/>
+            <a:ext cx="3121305" cy="394136"/>
           </a:xfrm>
           <a:prstGeom prst="rect">
             <a:avLst/>
@@ -11594,8 +11594,8 @@
         </p:nvSpPr>
         <p:spPr bwMode="auto">
           <a:xfrm>
-            <a:off x="594167" y="2794641"/>
-            <a:ext cx="1963838" cy="387736"/>
+            <a:off x="594166" y="2794641"/>
+            <a:ext cx="2936111" cy="394136"/>
           </a:xfrm>
           <a:prstGeom prst="rect">
             <a:avLst/>

</xml_diff>